<commit_message>
doc: Enhance PowerPoint Part 1 with Teragone branding
Apply professional Teragone-Factory design to Part 1 presentation:

Slide 1 (Hero):
- Dark blue Teragone background (#062643) with white text
- Dual logo placement: CISAC (top-left) + Teragone (top-right)
- Professional contrast and typography hierarchy

Slides 2-3 (Content):
- Thin horizontal accent bar at top (Teragone blue)
- Consistent slide numbering ("Part 1 | 2/3")
- Teragone color palette applied throughout

Color scheme:
- Primary: Teragone Dark Blue (#062643)
- Accents: Teragone Blue (#002f6c), Light Blue (#29629b)
- Text: White on dark, dark gray on light
- CISAC red reserved for client logo only

Technical:
- Updated generate_part1_pptx.py with branding functions
- Logo assets converted and ready
- Reusable header branding function for future parts
</commit_message>
<xml_diff>
--- a/docs/deliverables/first-restitution-2025-11-24/powerpoint/part1-journey-v2.pptx
+++ b/docs/deliverables/first-restitution-2025-11-24/powerpoint/part1-journey-v2.pptx
@@ -3086,7 +3086,7 @@
     <p:bg>
       <p:bgPr>
         <a:solidFill>
-          <a:srgbClr val="FFFFFF"/>
+          <a:srgbClr val="062643"/>
         </a:solidFill>
         <a:effectLst/>
       </p:bgPr>
@@ -3114,17 +3114,41 @@
         </p:blipFill>
         <p:spPr>
           <a:xfrm>
-            <a:off x="7772400" y="457200"/>
-            <a:ext cx="731520" cy="731520"/>
+            <a:off x="457200" y="365760"/>
+            <a:ext cx="640080" cy="640080"/>
           </a:xfrm>
           <a:prstGeom prst="rect">
             <a:avLst/>
           </a:prstGeom>
         </p:spPr>
       </p:pic>
-      <p:sp>
-        <p:nvSpPr>
-          <p:cNvPr id="3" name="TextBox 2"/>
+      <p:pic>
+        <p:nvPicPr>
+          <p:cNvPr id="3" name="Picture 2" descr="Blanc_Teragone-Factory-logo.png"/>
+          <p:cNvPicPr>
+            <a:picLocks noChangeAspect="1"/>
+          </p:cNvPicPr>
+          <p:nvPr/>
+        </p:nvPicPr>
+        <p:blipFill>
+          <a:blip r:embed="rId3"/>
+          <a:stretch>
+            <a:fillRect/>
+          </a:stretch>
+        </p:blipFill>
+        <p:spPr>
+          <a:xfrm>
+            <a:off x="7132320" y="365760"/>
+            <a:ext cx="2073859" cy="640080"/>
+          </a:xfrm>
+          <a:prstGeom prst="rect">
+            <a:avLst/>
+          </a:prstGeom>
+        </p:spPr>
+      </p:pic>
+      <p:sp>
+        <p:nvSpPr>
+          <p:cNvPr id="4" name="TextBox 3"/>
           <p:cNvSpPr txBox="1"/>
           <p:nvPr/>
         </p:nvSpPr>
@@ -3147,7 +3171,7 @@
             <a:pPr algn="l">
               <a:defRPr sz="5400" b="1">
                 <a:solidFill>
-                  <a:srgbClr val="002F6C"/>
+                  <a:srgbClr val="FFFFFF"/>
                 </a:solidFill>
               </a:defRPr>
             </a:pPr>
@@ -3159,7 +3183,7 @@
       </p:sp>
       <p:sp>
         <p:nvSpPr>
-          <p:cNvPr id="4" name="TextBox 3"/>
+          <p:cNvPr id="5" name="TextBox 4"/>
           <p:cNvSpPr txBox="1"/>
           <p:nvPr/>
         </p:nvSpPr>
@@ -3182,7 +3206,7 @@
             <a:pPr algn="l">
               <a:defRPr sz="3200">
                 <a:solidFill>
-                  <a:srgbClr val="29629B"/>
+                  <a:srgbClr val="F5F5F5"/>
                 </a:solidFill>
               </a:defRPr>
             </a:pPr>
@@ -3194,7 +3218,7 @@
       </p:sp>
       <p:sp>
         <p:nvSpPr>
-          <p:cNvPr id="5" name="TextBox 4"/>
+          <p:cNvPr id="6" name="TextBox 5"/>
           <p:cNvSpPr txBox="1"/>
           <p:nvPr/>
         </p:nvSpPr>
@@ -3217,7 +3241,7 @@
             <a:pPr algn="l">
               <a:defRPr sz="2000">
                 <a:solidFill>
-                  <a:srgbClr val="404040"/>
+                  <a:srgbClr val="FFFFFF"/>
                 </a:solidFill>
               </a:defRPr>
             </a:pPr>
@@ -3229,7 +3253,7 @@
             <a:pPr algn="l">
               <a:defRPr sz="2000">
                 <a:solidFill>
-                  <a:srgbClr val="404040"/>
+                  <a:srgbClr val="FFFFFF"/>
                 </a:solidFill>
               </a:defRPr>
             </a:pPr>
@@ -3241,7 +3265,7 @@
       </p:sp>
       <p:sp>
         <p:nvSpPr>
-          <p:cNvPr id="6" name="TextBox 5"/>
+          <p:cNvPr id="7" name="TextBox 6"/>
           <p:cNvSpPr txBox="1"/>
           <p:nvPr/>
         </p:nvSpPr>
@@ -3264,7 +3288,7 @@
             <a:pPr algn="l">
               <a:defRPr sz="1800">
                 <a:solidFill>
-                  <a:srgbClr val="404040"/>
+                  <a:srgbClr val="F5F5F5"/>
                 </a:solidFill>
               </a:defRPr>
             </a:pPr>
@@ -3302,13 +3326,88 @@
       <p:grpSpPr/>
       <p:sp>
         <p:nvSpPr>
-          <p:cNvPr id="2" name="TextBox 1"/>
+          <p:cNvPr id="2" name="Rectangle 1"/>
+          <p:cNvSpPr/>
+          <p:nvPr/>
+        </p:nvSpPr>
+        <p:spPr>
+          <a:xfrm>
+            <a:off x="0" y="0"/>
+            <a:ext cx="9144000" cy="45720"/>
+          </a:xfrm>
+          <a:prstGeom prst="rect">
+            <a:avLst/>
+          </a:prstGeom>
+          <a:solidFill>
+            <a:srgbClr val="062643"/>
+          </a:solidFill>
+        </p:spPr>
+        <p:style>
+          <a:lnRef idx="1">
+            <a:schemeClr val="accent1"/>
+          </a:lnRef>
+          <a:fillRef idx="3">
+            <a:schemeClr val="accent1"/>
+          </a:fillRef>
+          <a:effectRef idx="2">
+            <a:schemeClr val="accent1"/>
+          </a:effectRef>
+          <a:fontRef idx="minor">
+            <a:schemeClr val="lt1"/>
+          </a:fontRef>
+        </p:style>
+        <p:txBody>
+          <a:bodyPr rtlCol="0" anchor="ctr"/>
+          <a:lstStyle/>
+          <a:p>
+            <a:pPr algn="ctr"/>
+          </a:p>
+        </p:txBody>
+      </p:sp>
+      <p:sp>
+        <p:nvSpPr>
+          <p:cNvPr id="3" name="TextBox 2"/>
           <p:cNvSpPr txBox="1"/>
           <p:nvPr/>
         </p:nvSpPr>
         <p:spPr>
           <a:xfrm>
-            <a:off x="457200" y="274320"/>
+            <a:off x="7315200" y="91440"/>
+            <a:ext cx="1371600" cy="274320"/>
+          </a:xfrm>
+          <a:prstGeom prst="rect">
+            <a:avLst/>
+          </a:prstGeom>
+          <a:noFill/>
+        </p:spPr>
+        <p:txBody>
+          <a:bodyPr wrap="none">
+            <a:spAutoFit/>
+          </a:bodyPr>
+          <a:lstStyle/>
+          <a:p>
+            <a:pPr algn="r">
+              <a:defRPr sz="1000">
+                <a:solidFill>
+                  <a:srgbClr val="808080"/>
+                </a:solidFill>
+              </a:defRPr>
+            </a:pPr>
+            <a:r>
+              <a:t>Part 1 | 2/3</a:t>
+            </a:r>
+          </a:p>
+        </p:txBody>
+      </p:sp>
+      <p:sp>
+        <p:nvSpPr>
+          <p:cNvPr id="4" name="TextBox 3"/>
+          <p:cNvSpPr txBox="1"/>
+          <p:nvPr/>
+        </p:nvSpPr>
+        <p:spPr>
+          <a:xfrm>
+            <a:off x="457200" y="457200"/>
             <a:ext cx="8229600" cy="548640"/>
           </a:xfrm>
           <a:prstGeom prst="rect">
@@ -3337,7 +3436,7 @@
       </p:sp>
       <p:pic>
         <p:nvPicPr>
-          <p:cNvPr id="3" name="Picture 2" descr="part1-journey_1_.png"/>
+          <p:cNvPr id="5" name="Picture 4" descr="part1-journey_1_.png"/>
           <p:cNvPicPr>
             <a:picLocks noChangeAspect="1"/>
           </p:cNvPicPr>
@@ -3361,7 +3460,7 @@
       </p:pic>
       <p:sp>
         <p:nvSpPr>
-          <p:cNvPr id="4" name="TextBox 3"/>
+          <p:cNvPr id="6" name="TextBox 5"/>
           <p:cNvSpPr txBox="1"/>
           <p:nvPr/>
         </p:nvSpPr>
@@ -3471,7 +3570,7 @@
       </p:sp>
       <p:sp>
         <p:nvSpPr>
-          <p:cNvPr id="5" name="TextBox 4"/>
+          <p:cNvPr id="7" name="TextBox 6"/>
           <p:cNvSpPr txBox="1"/>
           <p:nvPr/>
         </p:nvSpPr>
@@ -3532,13 +3631,88 @@
       <p:grpSpPr/>
       <p:sp>
         <p:nvSpPr>
-          <p:cNvPr id="2" name="TextBox 1"/>
+          <p:cNvPr id="2" name="Rectangle 1"/>
+          <p:cNvSpPr/>
+          <p:nvPr/>
+        </p:nvSpPr>
+        <p:spPr>
+          <a:xfrm>
+            <a:off x="0" y="0"/>
+            <a:ext cx="9144000" cy="45720"/>
+          </a:xfrm>
+          <a:prstGeom prst="rect">
+            <a:avLst/>
+          </a:prstGeom>
+          <a:solidFill>
+            <a:srgbClr val="062643"/>
+          </a:solidFill>
+        </p:spPr>
+        <p:style>
+          <a:lnRef idx="1">
+            <a:schemeClr val="accent1"/>
+          </a:lnRef>
+          <a:fillRef idx="3">
+            <a:schemeClr val="accent1"/>
+          </a:fillRef>
+          <a:effectRef idx="2">
+            <a:schemeClr val="accent1"/>
+          </a:effectRef>
+          <a:fontRef idx="minor">
+            <a:schemeClr val="lt1"/>
+          </a:fontRef>
+        </p:style>
+        <p:txBody>
+          <a:bodyPr rtlCol="0" anchor="ctr"/>
+          <a:lstStyle/>
+          <a:p>
+            <a:pPr algn="ctr"/>
+          </a:p>
+        </p:txBody>
+      </p:sp>
+      <p:sp>
+        <p:nvSpPr>
+          <p:cNvPr id="3" name="TextBox 2"/>
           <p:cNvSpPr txBox="1"/>
           <p:nvPr/>
         </p:nvSpPr>
         <p:spPr>
           <a:xfrm>
-            <a:off x="457200" y="274320"/>
+            <a:off x="7315200" y="91440"/>
+            <a:ext cx="1371600" cy="274320"/>
+          </a:xfrm>
+          <a:prstGeom prst="rect">
+            <a:avLst/>
+          </a:prstGeom>
+          <a:noFill/>
+        </p:spPr>
+        <p:txBody>
+          <a:bodyPr wrap="none">
+            <a:spAutoFit/>
+          </a:bodyPr>
+          <a:lstStyle/>
+          <a:p>
+            <a:pPr algn="r">
+              <a:defRPr sz="1000">
+                <a:solidFill>
+                  <a:srgbClr val="808080"/>
+                </a:solidFill>
+              </a:defRPr>
+            </a:pPr>
+            <a:r>
+              <a:t>Part 1 | 3/3</a:t>
+            </a:r>
+          </a:p>
+        </p:txBody>
+      </p:sp>
+      <p:sp>
+        <p:nvSpPr>
+          <p:cNvPr id="4" name="TextBox 3"/>
+          <p:cNvSpPr txBox="1"/>
+          <p:nvPr/>
+        </p:nvSpPr>
+        <p:spPr>
+          <a:xfrm>
+            <a:off x="457200" y="457200"/>
             <a:ext cx="8229600" cy="548640"/>
           </a:xfrm>
           <a:prstGeom prst="rect">
@@ -3567,7 +3741,7 @@
       </p:sp>
       <p:sp>
         <p:nvSpPr>
-          <p:cNvPr id="3" name="TextBox 2"/>
+          <p:cNvPr id="5" name="TextBox 4"/>
           <p:cNvSpPr txBox="1"/>
           <p:nvPr/>
         </p:nvSpPr>
@@ -3662,7 +3836,7 @@
       </p:sp>
       <p:sp>
         <p:nvSpPr>
-          <p:cNvPr id="4" name="TextBox 3"/>
+          <p:cNvPr id="6" name="TextBox 5"/>
           <p:cNvSpPr txBox="1"/>
           <p:nvPr/>
         </p:nvSpPr>
@@ -3787,7 +3961,7 @@
       </p:sp>
       <p:sp>
         <p:nvSpPr>
-          <p:cNvPr id="5" name="TextBox 4"/>
+          <p:cNvPr id="7" name="TextBox 6"/>
           <p:cNvSpPr txBox="1"/>
           <p:nvPr/>
         </p:nvSpPr>

</xml_diff>